<commit_message>
[MOD] SVRL conformance suite; implement compile tests for same
</commit_message>
<xml_diff>
--- a/Markup UK 2023 slides.pptx
+++ b/Markup UK 2023 slides.pptx
@@ -5,7 +5,7 @@
     <p:sldMasterId id="2147483648" r:id="rId1"/>
   </p:sldMasterIdLst>
   <p:notesMasterIdLst>
-    <p:notesMasterId r:id="rId22"/>
+    <p:notesMasterId r:id="rId23"/>
   </p:notesMasterIdLst>
   <p:sldIdLst>
     <p:sldId id="256" r:id="rId2"/>
@@ -23,11 +23,12 @@
     <p:sldId id="273" r:id="rId14"/>
     <p:sldId id="274" r:id="rId15"/>
     <p:sldId id="275" r:id="rId16"/>
-    <p:sldId id="261" r:id="rId17"/>
-    <p:sldId id="262" r:id="rId18"/>
-    <p:sldId id="263" r:id="rId19"/>
-    <p:sldId id="264" r:id="rId20"/>
-    <p:sldId id="266" r:id="rId21"/>
+    <p:sldId id="276" r:id="rId17"/>
+    <p:sldId id="261" r:id="rId18"/>
+    <p:sldId id="262" r:id="rId19"/>
+    <p:sldId id="263" r:id="rId20"/>
+    <p:sldId id="264" r:id="rId21"/>
+    <p:sldId id="266" r:id="rId22"/>
   </p:sldIdLst>
   <p:sldSz cx="12192000" cy="6858000"/>
   <p:notesSz cx="6858000" cy="9144000"/>
@@ -742,6 +743,111 @@
     <p:extLst>
       <p:ext uri="{BB962C8B-B14F-4D97-AF65-F5344CB8AC3E}">
         <p14:creationId xmlns:p14="http://schemas.microsoft.com/office/powerpoint/2010/main" val="160635231"/>
+      </p:ext>
+    </p:extLst>
+  </p:cSld>
+  <p:clrMapOvr>
+    <a:masterClrMapping/>
+  </p:clrMapOvr>
+</p:notes>
+</file>
+
+<file path=ppt/notesSlides/notesSlide12.xml><?xml version="1.0" encoding="utf-8"?>
+<p:notes xmlns:a="http://schemas.openxmlformats.org/drawingml/2006/main" xmlns:r="http://schemas.openxmlformats.org/officeDocument/2006/relationships" xmlns:p="http://schemas.openxmlformats.org/presentationml/2006/main">
+  <p:cSld>
+    <p:spTree>
+      <p:nvGrpSpPr>
+        <p:cNvPr id="1" name=""/>
+        <p:cNvGrpSpPr/>
+        <p:nvPr/>
+      </p:nvGrpSpPr>
+      <p:grpSpPr>
+        <a:xfrm>
+          <a:off x="0" y="0"/>
+          <a:ext cx="0" cy="0"/>
+          <a:chOff x="0" y="0"/>
+          <a:chExt cx="0" cy="0"/>
+        </a:xfrm>
+      </p:grpSpPr>
+      <p:sp>
+        <p:nvSpPr>
+          <p:cNvPr id="2" name="Slide Image Placeholder 1"/>
+          <p:cNvSpPr>
+            <a:spLocks noGrp="1" noRot="1" noChangeAspect="1"/>
+          </p:cNvSpPr>
+          <p:nvPr>
+            <p:ph type="sldImg"/>
+          </p:nvPr>
+        </p:nvSpPr>
+        <p:spPr/>
+      </p:sp>
+      <p:sp>
+        <p:nvSpPr>
+          <p:cNvPr id="3" name="Notes Placeholder 2"/>
+          <p:cNvSpPr>
+            <a:spLocks noGrp="1"/>
+          </p:cNvSpPr>
+          <p:nvPr>
+            <p:ph type="body" idx="1"/>
+          </p:nvPr>
+        </p:nvSpPr>
+        <p:spPr/>
+        <p:txBody>
+          <a:bodyPr/>
+          <a:lstStyle/>
+          <a:p>
+            <a:r>
+              <a:rPr lang="en-GB" dirty="0"/>
+              <a:t>Before diving into approach, an overview of </a:t>
+            </a:r>
+            <a:r>
+              <a:rPr lang="en-GB" dirty="0" err="1"/>
+              <a:t>Schematron</a:t>
+            </a:r>
+            <a:r>
+              <a:rPr lang="en-GB" dirty="0"/>
+              <a:t> schema structure: </a:t>
+            </a:r>
+          </a:p>
+          <a:p>
+            <a:pPr lvl="1"/>
+            <a:r>
+              <a:rPr lang="en-GB" dirty="0"/>
+              <a:t>Phase, pattern, rule, constraints (diagram)</a:t>
+            </a:r>
+          </a:p>
+          <a:p>
+            <a:endParaRPr lang="en-GB" dirty="0"/>
+          </a:p>
+        </p:txBody>
+      </p:sp>
+      <p:sp>
+        <p:nvSpPr>
+          <p:cNvPr id="4" name="Slide Number Placeholder 3"/>
+          <p:cNvSpPr>
+            <a:spLocks noGrp="1"/>
+          </p:cNvSpPr>
+          <p:nvPr>
+            <p:ph type="sldNum" sz="quarter" idx="5"/>
+          </p:nvPr>
+        </p:nvSpPr>
+        <p:spPr/>
+        <p:txBody>
+          <a:bodyPr/>
+          <a:lstStyle/>
+          <a:p>
+            <a:fld id="{02BDF569-F48B-4704-ADB2-54F694482806}" type="slidenum">
+              <a:rPr lang="en-GB" smtClean="0"/>
+              <a:t>17</a:t>
+            </a:fld>
+            <a:endParaRPr lang="en-GB"/>
+          </a:p>
+        </p:txBody>
+      </p:sp>
+    </p:spTree>
+    <p:extLst>
+      <p:ext uri="{BB962C8B-B14F-4D97-AF65-F5344CB8AC3E}">
+        <p14:creationId xmlns:p14="http://schemas.microsoft.com/office/powerpoint/2010/main" val="545447209"/>
       </p:ext>
     </p:extLst>
   </p:cSld>
@@ -6151,7 +6257,7 @@
             </a:r>
             <a:r>
               <a:rPr lang="en-GB" dirty="0"/>
-              <a:t> […]"</a:t>
+              <a:t> [etc.]"</a:t>
             </a:r>
           </a:p>
         </p:txBody>
@@ -6565,21 +6671,106 @@
                 <a:latin typeface="Courier New" panose="02070309020205020404" pitchFamily="49" charset="0"/>
                 <a:cs typeface="Courier New" panose="02070309020205020404" pitchFamily="49" charset="0"/>
               </a:rPr>
-              <a:t>            &lt;</a:t>
-            </a:r>
-            <a:r>
-              <a:rPr lang="en-GB" sz="1800" dirty="0" err="1">
+              <a:t>            </a:t>
+            </a:r>
+            <a:r>
+              <a:rPr lang="en-GB" sz="1800" b="1" dirty="0">
+                <a:latin typeface="Courier New" panose="02070309020205020404" pitchFamily="49" charset="0"/>
+                <a:cs typeface="Courier New" panose="02070309020205020404" pitchFamily="49" charset="0"/>
+              </a:rPr>
+              <a:t>&lt;</a:t>
+            </a:r>
+            <a:r>
+              <a:rPr lang="en-GB" sz="1800" b="1" dirty="0" err="1">
                 <a:latin typeface="Courier New" panose="02070309020205020404" pitchFamily="49" charset="0"/>
                 <a:cs typeface="Courier New" panose="02070309020205020404" pitchFamily="49" charset="0"/>
               </a:rPr>
               <a:t>svrl:failed-assert</a:t>
             </a:r>
             <a:r>
+              <a:rPr lang="en-GB" sz="1800" b="1" dirty="0">
+                <a:latin typeface="Courier New" panose="02070309020205020404" pitchFamily="49" charset="0"/>
+                <a:cs typeface="Courier New" panose="02070309020205020404" pitchFamily="49" charset="0"/>
+              </a:rPr>
+              <a:t> test="{$assert/@test}" role="warning"&gt;</a:t>
+            </a:r>
+          </a:p>
+          <a:p>
+            <a:pPr marL="0" indent="0">
+              <a:buNone/>
+            </a:pPr>
+            <a:r>
+              <a:rPr lang="en-GB" sz="1800" b="1" dirty="0">
+                <a:latin typeface="Courier New" panose="02070309020205020404" pitchFamily="49" charset="0"/>
+                <a:cs typeface="Courier New" panose="02070309020205020404" pitchFamily="49" charset="0"/>
+              </a:rPr>
+              <a:t>              &lt;</a:t>
+            </a:r>
+            <a:r>
+              <a:rPr lang="en-GB" sz="1800" b="1" dirty="0" err="1">
+                <a:latin typeface="Courier New" panose="02070309020205020404" pitchFamily="49" charset="0"/>
+                <a:cs typeface="Courier New" panose="02070309020205020404" pitchFamily="49" charset="0"/>
+              </a:rPr>
+              <a:t>svrl:text</a:t>
+            </a:r>
+            <a:r>
+              <a:rPr lang="en-GB" sz="1800" b="1" dirty="0">
+                <a:latin typeface="Courier New" panose="02070309020205020404" pitchFamily="49" charset="0"/>
+                <a:cs typeface="Courier New" panose="02070309020205020404" pitchFamily="49" charset="0"/>
+              </a:rPr>
+              <a:t>&gt;{data($assert)}&lt;/</a:t>
+            </a:r>
+            <a:r>
+              <a:rPr lang="en-GB" sz="1800" b="1" dirty="0" err="1">
+                <a:latin typeface="Courier New" panose="02070309020205020404" pitchFamily="49" charset="0"/>
+                <a:cs typeface="Courier New" panose="02070309020205020404" pitchFamily="49" charset="0"/>
+              </a:rPr>
+              <a:t>svrl:text</a:t>
+            </a:r>
+            <a:r>
+              <a:rPr lang="en-GB" sz="1800" b="1" dirty="0">
+                <a:latin typeface="Courier New" panose="02070309020205020404" pitchFamily="49" charset="0"/>
+                <a:cs typeface="Courier New" panose="02070309020205020404" pitchFamily="49" charset="0"/>
+              </a:rPr>
+              <a:t>&gt;</a:t>
+            </a:r>
+          </a:p>
+          <a:p>
+            <a:pPr marL="0" indent="0">
+              <a:buNone/>
+            </a:pPr>
+            <a:r>
+              <a:rPr lang="en-GB" sz="1800" b="1" dirty="0">
+                <a:latin typeface="Courier New" panose="02070309020205020404" pitchFamily="49" charset="0"/>
+                <a:cs typeface="Courier New" panose="02070309020205020404" pitchFamily="49" charset="0"/>
+              </a:rPr>
+              <a:t>            &lt;/</a:t>
+            </a:r>
+            <a:r>
+              <a:rPr lang="en-GB" sz="1800" b="1" dirty="0" err="1">
+                <a:latin typeface="Courier New" panose="02070309020205020404" pitchFamily="49" charset="0"/>
+                <a:cs typeface="Courier New" panose="02070309020205020404" pitchFamily="49" charset="0"/>
+              </a:rPr>
+              <a:t>svrl:failed-assert</a:t>
+            </a:r>
+            <a:r>
+              <a:rPr lang="en-GB" sz="1800" b="1" dirty="0">
+                <a:latin typeface="Courier New" panose="02070309020205020404" pitchFamily="49" charset="0"/>
+                <a:cs typeface="Courier New" panose="02070309020205020404" pitchFamily="49" charset="0"/>
+              </a:rPr>
+              <a:t>&gt;</a:t>
+            </a:r>
+          </a:p>
+          <a:p>
+            <a:pPr marL="0" indent="0">
+              <a:buNone/>
+            </a:pPr>
+            <a:r>
               <a:rPr lang="en-GB" sz="1800" dirty="0">
                 <a:latin typeface="Courier New" panose="02070309020205020404" pitchFamily="49" charset="0"/>
                 <a:cs typeface="Courier New" panose="02070309020205020404" pitchFamily="49" charset="0"/>
               </a:rPr>
-              <a:t> test="{$assert/@test}" role="warning"&gt;</a:t>
+              <a:t>        else</a:t>
             </a:r>
           </a:p>
           <a:p>
@@ -6591,31 +6782,88 @@
                 <a:latin typeface="Courier New" panose="02070309020205020404" pitchFamily="49" charset="0"/>
                 <a:cs typeface="Courier New" panose="02070309020205020404" pitchFamily="49" charset="0"/>
               </a:rPr>
+              <a:t>          if (exists($xml[$assert/@test])) then ()</a:t>
+            </a:r>
+          </a:p>
+          <a:p>
+            <a:pPr marL="0" indent="0">
+              <a:buNone/>
+            </a:pPr>
+            <a:r>
+              <a:rPr lang="en-GB" sz="1800" dirty="0">
+                <a:latin typeface="Courier New" panose="02070309020205020404" pitchFamily="49" charset="0"/>
+                <a:cs typeface="Courier New" panose="02070309020205020404" pitchFamily="49" charset="0"/>
+              </a:rPr>
+              <a:t>          else</a:t>
+            </a:r>
+          </a:p>
+          <a:p>
+            <a:pPr marL="0" indent="0">
+              <a:buNone/>
+            </a:pPr>
+            <a:r>
+              <a:rPr lang="en-GB" sz="1800" dirty="0">
+                <a:latin typeface="Courier New" panose="02070309020205020404" pitchFamily="49" charset="0"/>
+                <a:cs typeface="Courier New" panose="02070309020205020404" pitchFamily="49" charset="0"/>
+              </a:rPr>
+              <a:t>            </a:t>
+            </a:r>
+            <a:r>
+              <a:rPr lang="en-GB" sz="1800" b="1" dirty="0">
+                <a:latin typeface="Courier New" panose="02070309020205020404" pitchFamily="49" charset="0"/>
+                <a:cs typeface="Courier New" panose="02070309020205020404" pitchFamily="49" charset="0"/>
+              </a:rPr>
+              <a:t>&lt;</a:t>
+            </a:r>
+            <a:r>
+              <a:rPr lang="en-GB" sz="1800" b="1" dirty="0" err="1">
+                <a:latin typeface="Courier New" panose="02070309020205020404" pitchFamily="49" charset="0"/>
+                <a:cs typeface="Courier New" panose="02070309020205020404" pitchFamily="49" charset="0"/>
+              </a:rPr>
+              <a:t>svrl:failed-assert</a:t>
+            </a:r>
+            <a:r>
+              <a:rPr lang="en-GB" sz="1800" b="1" dirty="0">
+                <a:latin typeface="Courier New" panose="02070309020205020404" pitchFamily="49" charset="0"/>
+                <a:cs typeface="Courier New" panose="02070309020205020404" pitchFamily="49" charset="0"/>
+              </a:rPr>
+              <a:t> test="{$assert/@test}"&gt;</a:t>
+            </a:r>
+          </a:p>
+          <a:p>
+            <a:pPr marL="0" indent="0">
+              <a:buNone/>
+            </a:pPr>
+            <a:r>
+              <a:rPr lang="en-GB" sz="1800" b="1" dirty="0">
+                <a:latin typeface="Courier New" panose="02070309020205020404" pitchFamily="49" charset="0"/>
+                <a:cs typeface="Courier New" panose="02070309020205020404" pitchFamily="49" charset="0"/>
+              </a:rPr>
               <a:t>              &lt;</a:t>
             </a:r>
             <a:r>
-              <a:rPr lang="en-GB" sz="1800" dirty="0" err="1">
+              <a:rPr lang="en-GB" sz="1800" b="1" dirty="0" err="1">
                 <a:latin typeface="Courier New" panose="02070309020205020404" pitchFamily="49" charset="0"/>
                 <a:cs typeface="Courier New" panose="02070309020205020404" pitchFamily="49" charset="0"/>
               </a:rPr>
               <a:t>svrl:text</a:t>
             </a:r>
             <a:r>
-              <a:rPr lang="en-GB" sz="1800" dirty="0">
+              <a:rPr lang="en-GB" sz="1800" b="1" dirty="0">
                 <a:latin typeface="Courier New" panose="02070309020205020404" pitchFamily="49" charset="0"/>
                 <a:cs typeface="Courier New" panose="02070309020205020404" pitchFamily="49" charset="0"/>
               </a:rPr>
               <a:t>&gt;{data($assert)}&lt;/</a:t>
             </a:r>
             <a:r>
-              <a:rPr lang="en-GB" sz="1800" dirty="0" err="1">
+              <a:rPr lang="en-GB" sz="1800" b="1" dirty="0" err="1">
                 <a:latin typeface="Courier New" panose="02070309020205020404" pitchFamily="49" charset="0"/>
                 <a:cs typeface="Courier New" panose="02070309020205020404" pitchFamily="49" charset="0"/>
               </a:rPr>
               <a:t>svrl:text</a:t>
             </a:r>
             <a:r>
-              <a:rPr lang="en-GB" sz="1800" dirty="0">
+              <a:rPr lang="en-GB" sz="1800" b="1" dirty="0">
                 <a:latin typeface="Courier New" panose="02070309020205020404" pitchFamily="49" charset="0"/>
                 <a:cs typeface="Courier New" panose="02070309020205020404" pitchFamily="49" charset="0"/>
               </a:rPr>
@@ -6627,149 +6875,21 @@
               <a:buNone/>
             </a:pPr>
             <a:r>
-              <a:rPr lang="en-GB" sz="1800" dirty="0">
+              <a:rPr lang="en-GB" sz="1800" b="1" dirty="0">
                 <a:latin typeface="Courier New" panose="02070309020205020404" pitchFamily="49" charset="0"/>
                 <a:cs typeface="Courier New" panose="02070309020205020404" pitchFamily="49" charset="0"/>
               </a:rPr>
               <a:t>            &lt;/</a:t>
             </a:r>
             <a:r>
-              <a:rPr lang="en-GB" sz="1800" dirty="0" err="1">
+              <a:rPr lang="en-GB" sz="1800" b="1" dirty="0" err="1">
                 <a:latin typeface="Courier New" panose="02070309020205020404" pitchFamily="49" charset="0"/>
                 <a:cs typeface="Courier New" panose="02070309020205020404" pitchFamily="49" charset="0"/>
               </a:rPr>
               <a:t>svrl:failed-assert</a:t>
             </a:r>
             <a:r>
-              <a:rPr lang="en-GB" sz="1800" dirty="0">
-                <a:latin typeface="Courier New" panose="02070309020205020404" pitchFamily="49" charset="0"/>
-                <a:cs typeface="Courier New" panose="02070309020205020404" pitchFamily="49" charset="0"/>
-              </a:rPr>
-              <a:t>&gt;</a:t>
-            </a:r>
-          </a:p>
-          <a:p>
-            <a:pPr marL="0" indent="0">
-              <a:buNone/>
-            </a:pPr>
-            <a:r>
-              <a:rPr lang="en-GB" sz="1800" dirty="0">
-                <a:latin typeface="Courier New" panose="02070309020205020404" pitchFamily="49" charset="0"/>
-                <a:cs typeface="Courier New" panose="02070309020205020404" pitchFamily="49" charset="0"/>
-              </a:rPr>
-              <a:t>        else</a:t>
-            </a:r>
-          </a:p>
-          <a:p>
-            <a:pPr marL="0" indent="0">
-              <a:buNone/>
-            </a:pPr>
-            <a:r>
-              <a:rPr lang="en-GB" sz="1800" dirty="0">
-                <a:latin typeface="Courier New" panose="02070309020205020404" pitchFamily="49" charset="0"/>
-                <a:cs typeface="Courier New" panose="02070309020205020404" pitchFamily="49" charset="0"/>
-              </a:rPr>
-              <a:t>          if (exists($xml[$assert/@test])) then ()</a:t>
-            </a:r>
-          </a:p>
-          <a:p>
-            <a:pPr marL="0" indent="0">
-              <a:buNone/>
-            </a:pPr>
-            <a:r>
-              <a:rPr lang="en-GB" sz="1800" dirty="0">
-                <a:latin typeface="Courier New" panose="02070309020205020404" pitchFamily="49" charset="0"/>
-                <a:cs typeface="Courier New" panose="02070309020205020404" pitchFamily="49" charset="0"/>
-              </a:rPr>
-              <a:t>          else</a:t>
-            </a:r>
-          </a:p>
-          <a:p>
-            <a:pPr marL="0" indent="0">
-              <a:buNone/>
-            </a:pPr>
-            <a:r>
-              <a:rPr lang="en-GB" sz="1800" dirty="0">
-                <a:latin typeface="Courier New" panose="02070309020205020404" pitchFamily="49" charset="0"/>
-                <a:cs typeface="Courier New" panose="02070309020205020404" pitchFamily="49" charset="0"/>
-              </a:rPr>
-              <a:t>            &lt;</a:t>
-            </a:r>
-            <a:r>
-              <a:rPr lang="en-GB" sz="1800" dirty="0" err="1">
-                <a:latin typeface="Courier New" panose="02070309020205020404" pitchFamily="49" charset="0"/>
-                <a:cs typeface="Courier New" panose="02070309020205020404" pitchFamily="49" charset="0"/>
-              </a:rPr>
-              <a:t>svrl:failed-assert</a:t>
-            </a:r>
-            <a:r>
-              <a:rPr lang="en-GB" sz="1800" dirty="0">
-                <a:latin typeface="Courier New" panose="02070309020205020404" pitchFamily="49" charset="0"/>
-                <a:cs typeface="Courier New" panose="02070309020205020404" pitchFamily="49" charset="0"/>
-              </a:rPr>
-              <a:t> test="{$assert/@test}"&gt;</a:t>
-            </a:r>
-          </a:p>
-          <a:p>
-            <a:pPr marL="0" indent="0">
-              <a:buNone/>
-            </a:pPr>
-            <a:r>
-              <a:rPr lang="en-GB" sz="1800" dirty="0">
-                <a:latin typeface="Courier New" panose="02070309020205020404" pitchFamily="49" charset="0"/>
-                <a:cs typeface="Courier New" panose="02070309020205020404" pitchFamily="49" charset="0"/>
-              </a:rPr>
-              <a:t>              &lt;</a:t>
-            </a:r>
-            <a:r>
-              <a:rPr lang="en-GB" sz="1800" dirty="0" err="1">
-                <a:latin typeface="Courier New" panose="02070309020205020404" pitchFamily="49" charset="0"/>
-                <a:cs typeface="Courier New" panose="02070309020205020404" pitchFamily="49" charset="0"/>
-              </a:rPr>
-              <a:t>svrl:text</a:t>
-            </a:r>
-            <a:r>
-              <a:rPr lang="en-GB" sz="1800" dirty="0">
-                <a:latin typeface="Courier New" panose="02070309020205020404" pitchFamily="49" charset="0"/>
-                <a:cs typeface="Courier New" panose="02070309020205020404" pitchFamily="49" charset="0"/>
-              </a:rPr>
-              <a:t>&gt;{data($assert)}&lt;/</a:t>
-            </a:r>
-            <a:r>
-              <a:rPr lang="en-GB" sz="1800" dirty="0" err="1">
-                <a:latin typeface="Courier New" panose="02070309020205020404" pitchFamily="49" charset="0"/>
-                <a:cs typeface="Courier New" panose="02070309020205020404" pitchFamily="49" charset="0"/>
-              </a:rPr>
-              <a:t>svrl:text</a:t>
-            </a:r>
-            <a:r>
-              <a:rPr lang="en-GB" sz="1800" dirty="0">
-                <a:latin typeface="Courier New" panose="02070309020205020404" pitchFamily="49" charset="0"/>
-                <a:cs typeface="Courier New" panose="02070309020205020404" pitchFamily="49" charset="0"/>
-              </a:rPr>
-              <a:t>&gt;</a:t>
-            </a:r>
-          </a:p>
-          <a:p>
-            <a:pPr marL="0" indent="0">
-              <a:buNone/>
-            </a:pPr>
-            <a:r>
-              <a:rPr lang="en-GB" sz="1800" dirty="0">
-                <a:latin typeface="Courier New" panose="02070309020205020404" pitchFamily="49" charset="0"/>
-                <a:cs typeface="Courier New" panose="02070309020205020404" pitchFamily="49" charset="0"/>
-              </a:rPr>
-              <a:t>            &lt;/</a:t>
-            </a:r>
-            <a:r>
-              <a:rPr lang="en-GB" sz="1800" dirty="0" err="1">
-                <a:latin typeface="Courier New" panose="02070309020205020404" pitchFamily="49" charset="0"/>
-                <a:cs typeface="Courier New" panose="02070309020205020404" pitchFamily="49" charset="0"/>
-              </a:rPr>
-              <a:t>svrl:failed-assert</a:t>
-            </a:r>
-            <a:r>
-              <a:rPr lang="en-GB" sz="1800" dirty="0">
+              <a:rPr lang="en-GB" sz="1800" b="1" dirty="0">
                 <a:latin typeface="Courier New" panose="02070309020205020404" pitchFamily="49" charset="0"/>
                 <a:cs typeface="Courier New" panose="02070309020205020404" pitchFamily="49" charset="0"/>
               </a:rPr>
@@ -6822,7 +6942,7 @@
           <p:cNvPr id="2" name="Title 1">
             <a:extLst>
               <a:ext uri="{FF2B5EF4-FFF2-40B4-BE49-F238E27FC236}">
-                <a16:creationId xmlns:a16="http://schemas.microsoft.com/office/drawing/2014/main" id="{2FB356C2-06C4-442A-A402-479E04F3D635}"/>
+                <a16:creationId xmlns:a16="http://schemas.microsoft.com/office/drawing/2014/main" id="{6C57D578-CC16-4CA5-A771-965CFCC68AAA}"/>
               </a:ext>
             </a:extLst>
           </p:cNvPr>
@@ -6840,7 +6960,15 @@
           <a:p>
             <a:r>
               <a:rPr lang="en-GB" dirty="0"/>
-              <a:t>Schema structure</a:t>
+              <a:t>How asking </a:t>
+            </a:r>
+            <a:r>
+              <a:rPr lang="en-GB" dirty="0" err="1"/>
+              <a:t>ChatGPT</a:t>
+            </a:r>
+            <a:r>
+              <a:rPr lang="en-GB" dirty="0"/>
+              <a:t> helped</a:t>
             </a:r>
           </a:p>
         </p:txBody>
@@ -6850,7 +6978,7 @@
           <p:cNvPr id="3" name="Content Placeholder 2">
             <a:extLst>
               <a:ext uri="{FF2B5EF4-FFF2-40B4-BE49-F238E27FC236}">
-                <a16:creationId xmlns:a16="http://schemas.microsoft.com/office/drawing/2014/main" id="{1ED63B97-EB0E-4A38-A817-3F0BF69F104B}"/>
+                <a16:creationId xmlns:a16="http://schemas.microsoft.com/office/drawing/2014/main" id="{7F0F360A-24D7-4E74-B904-FE874F7F6273}"/>
               </a:ext>
             </a:extLst>
           </p:cNvPr>
@@ -6868,22 +6996,7 @@
           <a:p>
             <a:r>
               <a:rPr lang="en-GB" dirty="0"/>
-              <a:t>Before diving into approach, an overview of </a:t>
-            </a:r>
-            <a:r>
-              <a:rPr lang="en-GB" dirty="0" err="1"/>
-              <a:t>Schematron</a:t>
-            </a:r>
-            <a:r>
-              <a:rPr lang="en-GB" dirty="0"/>
-              <a:t> schema structure: </a:t>
-            </a:r>
-          </a:p>
-          <a:p>
-            <a:pPr lvl="1"/>
-            <a:r>
-              <a:rPr lang="en-GB" dirty="0"/>
-              <a:t>Phase, pattern, rule, constraints (diagram)</a:t>
+              <a:t>ISO; XQuery; SVRL</a:t>
             </a:r>
           </a:p>
         </p:txBody>
@@ -6891,7 +7004,7 @@
     </p:spTree>
     <p:extLst>
       <p:ext uri="{BB962C8B-B14F-4D97-AF65-F5344CB8AC3E}">
-        <p14:creationId xmlns:p14="http://schemas.microsoft.com/office/powerpoint/2010/main" val="2745836092"/>
+        <p14:creationId xmlns:p14="http://schemas.microsoft.com/office/powerpoint/2010/main" val="303467115"/>
       </p:ext>
     </p:extLst>
   </p:cSld>
@@ -6923,7 +7036,7 @@
           <p:cNvPr id="2" name="Title 1">
             <a:extLst>
               <a:ext uri="{FF2B5EF4-FFF2-40B4-BE49-F238E27FC236}">
-                <a16:creationId xmlns:a16="http://schemas.microsoft.com/office/drawing/2014/main" id="{EEA90060-1A29-470E-866E-70D5A351A181}"/>
+                <a16:creationId xmlns:a16="http://schemas.microsoft.com/office/drawing/2014/main" id="{2FB356C2-06C4-442A-A402-479E04F3D635}"/>
               </a:ext>
             </a:extLst>
           </p:cNvPr>
@@ -6941,43 +7054,50 @@
           <a:p>
             <a:r>
               <a:rPr lang="en-GB" dirty="0"/>
-              <a:t>Processing model</a:t>
-            </a:r>
-          </a:p>
-        </p:txBody>
-      </p:sp>
-      <p:sp>
-        <p:nvSpPr>
-          <p:cNvPr id="3" name="Content Placeholder 2">
-            <a:extLst>
-              <a:ext uri="{FF2B5EF4-FFF2-40B4-BE49-F238E27FC236}">
-                <a16:creationId xmlns:a16="http://schemas.microsoft.com/office/drawing/2014/main" id="{41DDF197-3764-4F6C-A6DB-E8373BD993B1}"/>
-              </a:ext>
-            </a:extLst>
-          </p:cNvPr>
-          <p:cNvSpPr>
-            <a:spLocks noGrp="1"/>
-          </p:cNvSpPr>
+              <a:t>Schema structure</a:t>
+            </a:r>
+          </a:p>
+        </p:txBody>
+      </p:sp>
+      <p:pic>
+        <p:nvPicPr>
+          <p:cNvPr id="5" name="Content Placeholder 4">
+            <a:extLst>
+              <a:ext uri="{FF2B5EF4-FFF2-40B4-BE49-F238E27FC236}">
+                <a16:creationId xmlns:a16="http://schemas.microsoft.com/office/drawing/2014/main" id="{7BB7C2D9-CCD6-495D-9EB3-54F0A69EEA49}"/>
+              </a:ext>
+            </a:extLst>
+          </p:cNvPr>
+          <p:cNvPicPr>
+            <a:picLocks noGrp="1" noChangeAspect="1"/>
+          </p:cNvPicPr>
           <p:nvPr>
             <p:ph idx="1"/>
           </p:nvPr>
-        </p:nvSpPr>
-        <p:spPr/>
-        <p:txBody>
-          <a:bodyPr/>
-          <a:lstStyle/>
-          <a:p>
-            <a:r>
-              <a:rPr lang="en-GB" dirty="0"/>
-              <a:t>Include, expand, compile</a:t>
-            </a:r>
-          </a:p>
-        </p:txBody>
-      </p:sp>
+        </p:nvPicPr>
+        <p:blipFill>
+          <a:blip r:embed="rId3">
+            <a:extLst>
+              <a:ext uri="{28A0092B-C50C-407E-A947-70E740481C1C}">
+                <a14:useLocalDpi xmlns:a14="http://schemas.microsoft.com/office/drawing/2010/main" val="0"/>
+              </a:ext>
+            </a:extLst>
+          </a:blip>
+          <a:stretch>
+            <a:fillRect/>
+          </a:stretch>
+        </p:blipFill>
+        <p:spPr>
+          <a:xfrm>
+            <a:off x="4310062" y="1643062"/>
+            <a:ext cx="3571875" cy="3571875"/>
+          </a:xfrm>
+        </p:spPr>
+      </p:pic>
     </p:spTree>
     <p:extLst>
       <p:ext uri="{BB962C8B-B14F-4D97-AF65-F5344CB8AC3E}">
-        <p14:creationId xmlns:p14="http://schemas.microsoft.com/office/powerpoint/2010/main" val="387842745"/>
+        <p14:creationId xmlns:p14="http://schemas.microsoft.com/office/powerpoint/2010/main" val="2745836092"/>
       </p:ext>
     </p:extLst>
   </p:cSld>
@@ -7009,7 +7129,7 @@
           <p:cNvPr id="2" name="Title 1">
             <a:extLst>
               <a:ext uri="{FF2B5EF4-FFF2-40B4-BE49-F238E27FC236}">
-                <a16:creationId xmlns:a16="http://schemas.microsoft.com/office/drawing/2014/main" id="{6775A2C5-0F9E-4A8E-B122-59CE8682FDCF}"/>
+                <a16:creationId xmlns:a16="http://schemas.microsoft.com/office/drawing/2014/main" id="{EEA90060-1A29-470E-866E-70D5A351A181}"/>
               </a:ext>
             </a:extLst>
           </p:cNvPr>
@@ -7027,7 +7147,7 @@
           <a:p>
             <a:r>
               <a:rPr lang="en-GB" dirty="0"/>
-              <a:t>Caveats</a:t>
+              <a:t>Processing model</a:t>
             </a:r>
           </a:p>
         </p:txBody>
@@ -7037,7 +7157,7 @@
           <p:cNvPr id="3" name="Content Placeholder 2">
             <a:extLst>
               <a:ext uri="{FF2B5EF4-FFF2-40B4-BE49-F238E27FC236}">
-                <a16:creationId xmlns:a16="http://schemas.microsoft.com/office/drawing/2014/main" id="{3C3FBDD6-99E9-4118-909C-CF9C85026BBE}"/>
+                <a16:creationId xmlns:a16="http://schemas.microsoft.com/office/drawing/2014/main" id="{41DDF197-3764-4F6C-A6DB-E8373BD993B1}"/>
               </a:ext>
             </a:extLst>
           </p:cNvPr>
@@ -7055,21 +7175,7 @@
           <a:p>
             <a:r>
               <a:rPr lang="en-GB" dirty="0"/>
-              <a:t>No expansion/inclusion &amp; WHY</a:t>
-            </a:r>
-          </a:p>
-          <a:p>
-            <a:r>
-              <a:rPr lang="en-GB" dirty="0"/>
-              <a:t>BUT </a:t>
-            </a:r>
-            <a:r>
-              <a:rPr lang="en-GB" i="1" dirty="0"/>
-              <a:t>dynamic evaluation</a:t>
-            </a:r>
-            <a:r>
-              <a:rPr lang="en-GB" dirty="0"/>
-              <a:t> as well as compilation</a:t>
+              <a:t>Include, expand, compile</a:t>
             </a:r>
           </a:p>
         </p:txBody>
@@ -7077,7 +7183,7 @@
     </p:spTree>
     <p:extLst>
       <p:ext uri="{BB962C8B-B14F-4D97-AF65-F5344CB8AC3E}">
-        <p14:creationId xmlns:p14="http://schemas.microsoft.com/office/powerpoint/2010/main" val="1039456742"/>
+        <p14:creationId xmlns:p14="http://schemas.microsoft.com/office/powerpoint/2010/main" val="387842745"/>
       </p:ext>
     </p:extLst>
   </p:cSld>
@@ -7109,7 +7215,7 @@
           <p:cNvPr id="2" name="Title 1">
             <a:extLst>
               <a:ext uri="{FF2B5EF4-FFF2-40B4-BE49-F238E27FC236}">
-                <a16:creationId xmlns:a16="http://schemas.microsoft.com/office/drawing/2014/main" id="{F8E39FCD-263E-49E9-A9BA-2CC51CD18818}"/>
+                <a16:creationId xmlns:a16="http://schemas.microsoft.com/office/drawing/2014/main" id="{6775A2C5-0F9E-4A8E-B122-59CE8682FDCF}"/>
               </a:ext>
             </a:extLst>
           </p:cNvPr>
@@ -7127,7 +7233,7 @@
           <a:p>
             <a:r>
               <a:rPr lang="en-GB" dirty="0"/>
-              <a:t>Evaluate vs compile</a:t>
+              <a:t>Caveats</a:t>
             </a:r>
           </a:p>
         </p:txBody>
@@ -7137,7 +7243,7 @@
           <p:cNvPr id="3" name="Content Placeholder 2">
             <a:extLst>
               <a:ext uri="{FF2B5EF4-FFF2-40B4-BE49-F238E27FC236}">
-                <a16:creationId xmlns:a16="http://schemas.microsoft.com/office/drawing/2014/main" id="{E6BBAF03-F045-4E55-9DD4-E380087EC493}"/>
+                <a16:creationId xmlns:a16="http://schemas.microsoft.com/office/drawing/2014/main" id="{3C3FBDD6-99E9-4118-909C-CF9C85026BBE}"/>
               </a:ext>
             </a:extLst>
           </p:cNvPr>
@@ -7155,11 +7261,21 @@
           <a:p>
             <a:r>
               <a:rPr lang="en-GB" dirty="0"/>
-              <a:t>[diagram the </a:t>
-            </a:r>
-            <a:r>
-              <a:rPr lang="en-GB"/>
-              <a:t>two approaches]</a:t>
+              <a:t>No expansion/inclusion &amp; WHY</a:t>
+            </a:r>
+          </a:p>
+          <a:p>
+            <a:r>
+              <a:rPr lang="en-GB" dirty="0"/>
+              <a:t>BUT </a:t>
+            </a:r>
+            <a:r>
+              <a:rPr lang="en-GB" i="1" dirty="0"/>
+              <a:t>dynamic evaluation</a:t>
+            </a:r>
+            <a:r>
+              <a:rPr lang="en-GB" dirty="0"/>
+              <a:t> as well as compilation</a:t>
             </a:r>
           </a:p>
         </p:txBody>
@@ -7167,7 +7283,7 @@
     </p:spTree>
     <p:extLst>
       <p:ext uri="{BB962C8B-B14F-4D97-AF65-F5344CB8AC3E}">
-        <p14:creationId xmlns:p14="http://schemas.microsoft.com/office/powerpoint/2010/main" val="2214602858"/>
+        <p14:creationId xmlns:p14="http://schemas.microsoft.com/office/powerpoint/2010/main" val="1039456742"/>
       </p:ext>
     </p:extLst>
   </p:cSld>
@@ -7282,6 +7398,96 @@
 </file>
 
 <file path=ppt/slides/slide20.xml><?xml version="1.0" encoding="utf-8"?>
+<p:sld xmlns:a="http://schemas.openxmlformats.org/drawingml/2006/main" xmlns:r="http://schemas.openxmlformats.org/officeDocument/2006/relationships" xmlns:p="http://schemas.openxmlformats.org/presentationml/2006/main">
+  <p:cSld>
+    <p:spTree>
+      <p:nvGrpSpPr>
+        <p:cNvPr id="1" name=""/>
+        <p:cNvGrpSpPr/>
+        <p:nvPr/>
+      </p:nvGrpSpPr>
+      <p:grpSpPr>
+        <a:xfrm>
+          <a:off x="0" y="0"/>
+          <a:ext cx="0" cy="0"/>
+          <a:chOff x="0" y="0"/>
+          <a:chExt cx="0" cy="0"/>
+        </a:xfrm>
+      </p:grpSpPr>
+      <p:sp>
+        <p:nvSpPr>
+          <p:cNvPr id="2" name="Title 1">
+            <a:extLst>
+              <a:ext uri="{FF2B5EF4-FFF2-40B4-BE49-F238E27FC236}">
+                <a16:creationId xmlns:a16="http://schemas.microsoft.com/office/drawing/2014/main" id="{F8E39FCD-263E-49E9-A9BA-2CC51CD18818}"/>
+              </a:ext>
+            </a:extLst>
+          </p:cNvPr>
+          <p:cNvSpPr>
+            <a:spLocks noGrp="1"/>
+          </p:cNvSpPr>
+          <p:nvPr>
+            <p:ph type="title"/>
+          </p:nvPr>
+        </p:nvSpPr>
+        <p:spPr/>
+        <p:txBody>
+          <a:bodyPr/>
+          <a:lstStyle/>
+          <a:p>
+            <a:r>
+              <a:rPr lang="en-GB" dirty="0"/>
+              <a:t>Evaluate vs compile</a:t>
+            </a:r>
+          </a:p>
+        </p:txBody>
+      </p:sp>
+      <p:sp>
+        <p:nvSpPr>
+          <p:cNvPr id="3" name="Content Placeholder 2">
+            <a:extLst>
+              <a:ext uri="{FF2B5EF4-FFF2-40B4-BE49-F238E27FC236}">
+                <a16:creationId xmlns:a16="http://schemas.microsoft.com/office/drawing/2014/main" id="{E6BBAF03-F045-4E55-9DD4-E380087EC493}"/>
+              </a:ext>
+            </a:extLst>
+          </p:cNvPr>
+          <p:cNvSpPr>
+            <a:spLocks noGrp="1"/>
+          </p:cNvSpPr>
+          <p:nvPr>
+            <p:ph idx="1"/>
+          </p:nvPr>
+        </p:nvSpPr>
+        <p:spPr/>
+        <p:txBody>
+          <a:bodyPr/>
+          <a:lstStyle/>
+          <a:p>
+            <a:r>
+              <a:rPr lang="en-GB" dirty="0"/>
+              <a:t>[diagram the </a:t>
+            </a:r>
+            <a:r>
+              <a:rPr lang="en-GB"/>
+              <a:t>two approaches]</a:t>
+            </a:r>
+          </a:p>
+        </p:txBody>
+      </p:sp>
+    </p:spTree>
+    <p:extLst>
+      <p:ext uri="{BB962C8B-B14F-4D97-AF65-F5344CB8AC3E}">
+        <p14:creationId xmlns:p14="http://schemas.microsoft.com/office/powerpoint/2010/main" val="2214602858"/>
+      </p:ext>
+    </p:extLst>
+  </p:cSld>
+  <p:clrMapOvr>
+    <a:masterClrMapping/>
+  </p:clrMapOvr>
+</p:sld>
+</file>
+
+<file path=ppt/slides/slide21.xml><?xml version="1.0" encoding="utf-8"?>
 <p:sld xmlns:a="http://schemas.openxmlformats.org/drawingml/2006/main" xmlns:r="http://schemas.openxmlformats.org/officeDocument/2006/relationships" xmlns:p="http://schemas.openxmlformats.org/presentationml/2006/main">
   <p:cSld>
     <p:spTree>

</xml_diff>